<commit_message>
Added Project Report outline
Updated Poster
+Team Info
+Picture of schematic
+Picture of board layout
</commit_message>
<xml_diff>
--- a/Documents/Poster.pptx
+++ b/Documents/Poster.pptx
@@ -305,7 +305,7 @@
             <a:fld id="{D9D26CB9-01E4-44B8-8084-BCC418CF4A2D}" type="datetimeFigureOut">
               <a:rPr lang="en-US" smtClean="0"/>
               <a:pPr/>
-              <a:t>5/5/2014</a:t>
+              <a:t>5/11/2014</a:t>
             </a:fld>
             <a:endParaRPr lang="en-US"/>
           </a:p>
@@ -472,7 +472,7 @@
             <a:fld id="{D9D26CB9-01E4-44B8-8084-BCC418CF4A2D}" type="datetimeFigureOut">
               <a:rPr lang="en-US" smtClean="0"/>
               <a:pPr/>
-              <a:t>5/5/2014</a:t>
+              <a:t>5/11/2014</a:t>
             </a:fld>
             <a:endParaRPr lang="en-US"/>
           </a:p>
@@ -649,7 +649,7 @@
             <a:fld id="{D9D26CB9-01E4-44B8-8084-BCC418CF4A2D}" type="datetimeFigureOut">
               <a:rPr lang="en-US" smtClean="0"/>
               <a:pPr/>
-              <a:t>5/5/2014</a:t>
+              <a:t>5/11/2014</a:t>
             </a:fld>
             <a:endParaRPr lang="en-US"/>
           </a:p>
@@ -816,7 +816,7 @@
             <a:fld id="{D9D26CB9-01E4-44B8-8084-BCC418CF4A2D}" type="datetimeFigureOut">
               <a:rPr lang="en-US" smtClean="0"/>
               <a:pPr/>
-              <a:t>5/5/2014</a:t>
+              <a:t>5/11/2014</a:t>
             </a:fld>
             <a:endParaRPr lang="en-US"/>
           </a:p>
@@ -1059,7 +1059,7 @@
             <a:fld id="{D9D26CB9-01E4-44B8-8084-BCC418CF4A2D}" type="datetimeFigureOut">
               <a:rPr lang="en-US" smtClean="0"/>
               <a:pPr/>
-              <a:t>5/5/2014</a:t>
+              <a:t>5/11/2014</a:t>
             </a:fld>
             <a:endParaRPr lang="en-US"/>
           </a:p>
@@ -1344,7 +1344,7 @@
             <a:fld id="{D9D26CB9-01E4-44B8-8084-BCC418CF4A2D}" type="datetimeFigureOut">
               <a:rPr lang="en-US" smtClean="0"/>
               <a:pPr/>
-              <a:t>5/5/2014</a:t>
+              <a:t>5/11/2014</a:t>
             </a:fld>
             <a:endParaRPr lang="en-US"/>
           </a:p>
@@ -1763,7 +1763,7 @@
             <a:fld id="{D9D26CB9-01E4-44B8-8084-BCC418CF4A2D}" type="datetimeFigureOut">
               <a:rPr lang="en-US" smtClean="0"/>
               <a:pPr/>
-              <a:t>5/5/2014</a:t>
+              <a:t>5/11/2014</a:t>
             </a:fld>
             <a:endParaRPr lang="en-US"/>
           </a:p>
@@ -1878,7 +1878,7 @@
             <a:fld id="{D9D26CB9-01E4-44B8-8084-BCC418CF4A2D}" type="datetimeFigureOut">
               <a:rPr lang="en-US" smtClean="0"/>
               <a:pPr/>
-              <a:t>5/5/2014</a:t>
+              <a:t>5/11/2014</a:t>
             </a:fld>
             <a:endParaRPr lang="en-US"/>
           </a:p>
@@ -1970,7 +1970,7 @@
             <a:fld id="{D9D26CB9-01E4-44B8-8084-BCC418CF4A2D}" type="datetimeFigureOut">
               <a:rPr lang="en-US" smtClean="0"/>
               <a:pPr/>
-              <a:t>5/5/2014</a:t>
+              <a:t>5/11/2014</a:t>
             </a:fld>
             <a:endParaRPr lang="en-US"/>
           </a:p>
@@ -2244,7 +2244,7 @@
             <a:fld id="{D9D26CB9-01E4-44B8-8084-BCC418CF4A2D}" type="datetimeFigureOut">
               <a:rPr lang="en-US" smtClean="0"/>
               <a:pPr/>
-              <a:t>5/5/2014</a:t>
+              <a:t>5/11/2014</a:t>
             </a:fld>
             <a:endParaRPr lang="en-US"/>
           </a:p>
@@ -2494,7 +2494,7 @@
             <a:fld id="{D9D26CB9-01E4-44B8-8084-BCC418CF4A2D}" type="datetimeFigureOut">
               <a:rPr lang="en-US" smtClean="0"/>
               <a:pPr/>
-              <a:t>5/5/2014</a:t>
+              <a:t>5/11/2014</a:t>
             </a:fld>
             <a:endParaRPr lang="en-US"/>
           </a:p>
@@ -2704,7 +2704,7 @@
             <a:fld id="{D9D26CB9-01E4-44B8-8084-BCC418CF4A2D}" type="datetimeFigureOut">
               <a:rPr lang="en-US" smtClean="0"/>
               <a:pPr/>
-              <a:t>5/5/2014</a:t>
+              <a:t>5/11/2014</a:t>
             </a:fld>
             <a:endParaRPr lang="en-US"/>
           </a:p>
@@ -3083,8 +3083,8 @@
         </p:nvSpPr>
         <p:spPr>
           <a:xfrm>
-            <a:off x="0" y="4940968"/>
-            <a:ext cx="20273209" cy="23567822"/>
+            <a:off x="76200" y="4940968"/>
+            <a:ext cx="20197009" cy="23567822"/>
           </a:xfrm>
           <a:prstGeom prst="rect">
             <a:avLst/>
@@ -3335,7 +3335,7 @@
         <p:spPr>
           <a:xfrm>
             <a:off x="1502228" y="609070"/>
-            <a:ext cx="19538234" cy="4508927"/>
+            <a:ext cx="38034515" cy="4508927"/>
           </a:xfrm>
           <a:prstGeom prst="rect">
             <a:avLst/>
@@ -3350,7 +3350,11 @@
           <a:p>
             <a:r>
               <a:rPr lang="en-US" sz="28700" dirty="0" smtClean="0"/>
-              <a:t>STEM Sensor</a:t>
+              <a:t>Erebus Labs STEM </a:t>
+            </a:r>
+            <a:r>
+              <a:rPr lang="en-US" sz="28700" dirty="0" smtClean="0"/>
+              <a:t>Sensor</a:t>
             </a:r>
           </a:p>
         </p:txBody>
@@ -3687,7 +3691,7 @@
           <a:lstStyle/>
           <a:p>
             <a:pPr algn="ctr"/>
-            <a:endParaRPr lang="en-US"/>
+            <a:endParaRPr lang="en-US" dirty="0"/>
           </a:p>
         </p:txBody>
       </p:sp>
@@ -3836,6 +3840,392 @@
           </a:fontRef>
         </p:style>
       </p:cxnSp>
+      <p:pic>
+        <p:nvPicPr>
+          <p:cNvPr id="3" name="Picture 2"/>
+          <p:cNvPicPr>
+            <a:picLocks noChangeAspect="1"/>
+          </p:cNvPicPr>
+          <p:nvPr/>
+        </p:nvPicPr>
+        <p:blipFill>
+          <a:blip r:embed="rId5">
+            <a:extLst>
+              <a:ext uri="{28A0092B-C50C-407E-A947-70E740481C1C}">
+                <a14:useLocalDpi xmlns:a14="http://schemas.microsoft.com/office/drawing/2010/main" val="0"/>
+              </a:ext>
+            </a:extLst>
+          </a:blip>
+          <a:stretch>
+            <a:fillRect/>
+          </a:stretch>
+        </p:blipFill>
+        <p:spPr>
+          <a:xfrm>
+            <a:off x="29500709" y="9156152"/>
+            <a:ext cx="3389096" cy="2992888"/>
+          </a:xfrm>
+          <a:prstGeom prst="rect">
+            <a:avLst/>
+          </a:prstGeom>
+        </p:spPr>
+      </p:pic>
+      <p:pic>
+        <p:nvPicPr>
+          <p:cNvPr id="6" name="Picture 5"/>
+          <p:cNvPicPr>
+            <a:picLocks noChangeAspect="1"/>
+          </p:cNvPicPr>
+          <p:nvPr/>
+        </p:nvPicPr>
+        <p:blipFill>
+          <a:blip r:embed="rId6">
+            <a:extLst>
+              <a:ext uri="{28A0092B-C50C-407E-A947-70E740481C1C}">
+                <a14:useLocalDpi xmlns:a14="http://schemas.microsoft.com/office/drawing/2010/main" val="0"/>
+              </a:ext>
+            </a:extLst>
+          </a:blip>
+          <a:stretch>
+            <a:fillRect/>
+          </a:stretch>
+        </p:blipFill>
+        <p:spPr>
+          <a:xfrm>
+            <a:off x="24301144" y="16427541"/>
+            <a:ext cx="15586183" cy="10100237"/>
+          </a:xfrm>
+          <a:prstGeom prst="rect">
+            <a:avLst/>
+          </a:prstGeom>
+        </p:spPr>
+      </p:pic>
+      <p:sp>
+        <p:nvSpPr>
+          <p:cNvPr id="7" name="TextBox 6"/>
+          <p:cNvSpPr txBox="1"/>
+          <p:nvPr/>
+        </p:nvSpPr>
+        <p:spPr>
+          <a:xfrm>
+            <a:off x="1073080" y="22243682"/>
+            <a:ext cx="6274204" cy="646331"/>
+          </a:xfrm>
+          <a:prstGeom prst="rect">
+            <a:avLst/>
+          </a:prstGeom>
+          <a:noFill/>
+        </p:spPr>
+        <p:txBody>
+          <a:bodyPr wrap="square" rtlCol="0">
+            <a:spAutoFit/>
+          </a:bodyPr>
+          <a:lstStyle/>
+          <a:p>
+            <a:pPr algn="ctr"/>
+            <a:r>
+              <a:rPr lang="en-US" sz="3600" b="1" dirty="0" smtClean="0"/>
+              <a:t>Meet The Team</a:t>
+            </a:r>
+            <a:endParaRPr lang="en-US" sz="3600" b="1" dirty="0"/>
+          </a:p>
+        </p:txBody>
+      </p:sp>
+      <p:sp>
+        <p:nvSpPr>
+          <p:cNvPr id="8" name="TextBox 7"/>
+          <p:cNvSpPr txBox="1"/>
+          <p:nvPr/>
+        </p:nvSpPr>
+        <p:spPr>
+          <a:xfrm>
+            <a:off x="1676400" y="23159550"/>
+            <a:ext cx="5646427" cy="5262979"/>
+          </a:xfrm>
+          <a:prstGeom prst="rect">
+            <a:avLst/>
+          </a:prstGeom>
+          <a:noFill/>
+        </p:spPr>
+        <p:txBody>
+          <a:bodyPr wrap="square" rtlCol="0">
+            <a:spAutoFit/>
+          </a:bodyPr>
+          <a:lstStyle/>
+          <a:p>
+            <a:pPr marL="231775" indent="-231775"/>
+            <a:r>
+              <a:rPr lang="en-US" sz="1600" b="1" dirty="0" smtClean="0"/>
+              <a:t>Scott Lawson:</a:t>
+            </a:r>
+          </a:p>
+          <a:p>
+            <a:pPr marL="231775"/>
+            <a:r>
+              <a:rPr lang="en-US" sz="1600" dirty="0" smtClean="0"/>
+              <a:t>Computer Engineering</a:t>
+            </a:r>
+            <a:endParaRPr lang="en-US" sz="1600" dirty="0"/>
+          </a:p>
+          <a:p>
+            <a:endParaRPr lang="en-US" sz="1600" dirty="0" smtClean="0"/>
+          </a:p>
+          <a:p>
+            <a:pPr marL="231775" indent="-231775"/>
+            <a:r>
+              <a:rPr lang="en-US" sz="1600" b="1" dirty="0"/>
+              <a:t>Max Cope:</a:t>
+            </a:r>
+          </a:p>
+          <a:p>
+            <a:pPr marL="231775"/>
+            <a:r>
+              <a:rPr lang="en-US" sz="1600" dirty="0"/>
+              <a:t>Electrical </a:t>
+            </a:r>
+            <a:r>
+              <a:rPr lang="en-US" sz="1600" dirty="0" smtClean="0"/>
+              <a:t>Engineering</a:t>
+            </a:r>
+          </a:p>
+          <a:p>
+            <a:pPr marL="231775"/>
+            <a:endParaRPr lang="en-US" sz="1600" dirty="0"/>
+          </a:p>
+          <a:p>
+            <a:pPr marL="231775" indent="-231775"/>
+            <a:r>
+              <a:rPr lang="en-US" sz="1600" b="1" dirty="0"/>
+              <a:t>Chris Clary:</a:t>
+            </a:r>
+          </a:p>
+          <a:p>
+            <a:pPr marL="231775"/>
+            <a:r>
+              <a:rPr lang="en-US" sz="1600" dirty="0"/>
+              <a:t>Electrical </a:t>
+            </a:r>
+            <a:r>
+              <a:rPr lang="en-US" sz="1600" dirty="0" smtClean="0"/>
+              <a:t>Engineering</a:t>
+            </a:r>
+          </a:p>
+          <a:p>
+            <a:pPr marL="231775"/>
+            <a:endParaRPr lang="en-US" sz="1600" dirty="0"/>
+          </a:p>
+          <a:p>
+            <a:pPr marL="231775" indent="-231775"/>
+            <a:r>
+              <a:rPr lang="en-US" sz="1600" b="1" dirty="0" smtClean="0"/>
+              <a:t>Bryan Button:</a:t>
+            </a:r>
+            <a:endParaRPr lang="en-US" sz="1600" b="1" dirty="0"/>
+          </a:p>
+          <a:p>
+            <a:pPr marL="231775"/>
+            <a:r>
+              <a:rPr lang="en-US" sz="1600" dirty="0"/>
+              <a:t>Electrical </a:t>
+            </a:r>
+            <a:r>
+              <a:rPr lang="en-US" sz="1600" dirty="0" smtClean="0"/>
+              <a:t>Engineering</a:t>
+            </a:r>
+          </a:p>
+          <a:p>
+            <a:pPr marL="231775"/>
+            <a:endParaRPr lang="en-US" sz="1600" dirty="0"/>
+          </a:p>
+          <a:p>
+            <a:pPr marL="231775" indent="-231775"/>
+            <a:r>
+              <a:rPr lang="en-US" sz="1600" b="1" dirty="0" smtClean="0"/>
+              <a:t>Mike </a:t>
+            </a:r>
+            <a:r>
+              <a:rPr lang="en-US" sz="1600" b="1" dirty="0" err="1" smtClean="0"/>
+              <a:t>Borowczak</a:t>
+            </a:r>
+            <a:r>
+              <a:rPr lang="en-US" sz="1600" b="1" dirty="0" smtClean="0"/>
+              <a:t>, Ph.D.:</a:t>
+            </a:r>
+            <a:endParaRPr lang="en-US" sz="1600" b="1" dirty="0"/>
+          </a:p>
+          <a:p>
+            <a:pPr marL="231775"/>
+            <a:r>
+              <a:rPr lang="en-US" sz="1600" dirty="0" smtClean="0"/>
+              <a:t>Sponsor</a:t>
+            </a:r>
+            <a:endParaRPr lang="en-US" sz="1600" dirty="0"/>
+          </a:p>
+          <a:p>
+            <a:pPr marL="231775"/>
+            <a:endParaRPr lang="en-US" sz="1600" dirty="0" smtClean="0"/>
+          </a:p>
+          <a:p>
+            <a:pPr marL="231775" indent="-231775"/>
+            <a:r>
+              <a:rPr lang="en-US" sz="1600" b="1" dirty="0" smtClean="0"/>
+              <a:t>Andrea Burrows, </a:t>
+            </a:r>
+            <a:r>
+              <a:rPr lang="en-US" sz="1600" b="1" dirty="0" err="1" smtClean="0"/>
+              <a:t>Ed.D</a:t>
+            </a:r>
+            <a:r>
+              <a:rPr lang="en-US" sz="1600" b="1" dirty="0" smtClean="0"/>
+              <a:t>.:</a:t>
+            </a:r>
+            <a:endParaRPr lang="en-US" sz="1600" dirty="0" smtClean="0"/>
+          </a:p>
+          <a:p>
+            <a:pPr marL="231775"/>
+            <a:r>
+              <a:rPr lang="en-US" sz="1600" dirty="0" smtClean="0"/>
+              <a:t>Sponsor</a:t>
+            </a:r>
+          </a:p>
+          <a:p>
+            <a:pPr marL="231775"/>
+            <a:endParaRPr lang="en-US" sz="1600" dirty="0" smtClean="0"/>
+          </a:p>
+          <a:p>
+            <a:pPr marL="231775" indent="-231775"/>
+            <a:r>
+              <a:rPr lang="en-US" sz="1600" b="1" dirty="0" smtClean="0"/>
+              <a:t>James Morris, Ph.D.:</a:t>
+            </a:r>
+            <a:endParaRPr lang="en-US" sz="1600" b="1" dirty="0"/>
+          </a:p>
+          <a:p>
+            <a:pPr marL="231775"/>
+            <a:r>
+              <a:rPr lang="en-US" sz="1600" dirty="0" smtClean="0"/>
+              <a:t>Advisor</a:t>
+            </a:r>
+            <a:endParaRPr lang="en-US" sz="1600" dirty="0"/>
+          </a:p>
+          <a:p>
+            <a:pPr marL="231775"/>
+            <a:endParaRPr lang="en-US" sz="1600" dirty="0"/>
+          </a:p>
+        </p:txBody>
+      </p:sp>
+      <p:pic>
+        <p:nvPicPr>
+          <p:cNvPr id="1026" name="Picture 2" descr="mike-borowczak.jpg (100×100)"/>
+          <p:cNvPicPr>
+            <a:picLocks noChangeAspect="1" noChangeArrowheads="1"/>
+          </p:cNvPicPr>
+          <p:nvPr/>
+        </p:nvPicPr>
+        <p:blipFill>
+          <a:blip r:embed="rId7">
+            <a:extLst>
+              <a:ext uri="{28A0092B-C50C-407E-A947-70E740481C1C}">
+                <a14:useLocalDpi xmlns:a14="http://schemas.microsoft.com/office/drawing/2010/main" val="0"/>
+              </a:ext>
+            </a:extLst>
+          </a:blip>
+          <a:srcRect/>
+          <a:stretch>
+            <a:fillRect/>
+          </a:stretch>
+        </p:blipFill>
+        <p:spPr bwMode="auto">
+          <a:xfrm>
+            <a:off x="1207103" y="26163383"/>
+            <a:ext cx="469297" cy="469297"/>
+          </a:xfrm>
+          <a:prstGeom prst="rect">
+            <a:avLst/>
+          </a:prstGeom>
+          <a:noFill/>
+          <a:extLst>
+            <a:ext uri="{909E8E84-426E-40DD-AFC4-6F175D3DCCD1}">
+              <a14:hiddenFill xmlns:a14="http://schemas.microsoft.com/office/drawing/2010/main">
+                <a:solidFill>
+                  <a:srgbClr val="FFFFFF"/>
+                </a:solidFill>
+              </a14:hiddenFill>
+            </a:ext>
+          </a:extLst>
+        </p:spPr>
+      </p:pic>
+      <p:pic>
+        <p:nvPicPr>
+          <p:cNvPr id="1028" name="Picture 4" descr="http://0.academia-photos.com/1273975/573103/713298/s200_andrea.burrows.jpg"/>
+          <p:cNvPicPr>
+            <a:picLocks noChangeAspect="1" noChangeArrowheads="1"/>
+          </p:cNvPicPr>
+          <p:nvPr/>
+        </p:nvPicPr>
+        <p:blipFill>
+          <a:blip r:embed="rId8" cstate="print">
+            <a:extLst>
+              <a:ext uri="{28A0092B-C50C-407E-A947-70E740481C1C}">
+                <a14:useLocalDpi xmlns:a14="http://schemas.microsoft.com/office/drawing/2010/main" val="0"/>
+              </a:ext>
+            </a:extLst>
+          </a:blip>
+          <a:srcRect/>
+          <a:stretch>
+            <a:fillRect/>
+          </a:stretch>
+        </p:blipFill>
+        <p:spPr bwMode="auto">
+          <a:xfrm>
+            <a:off x="1219200" y="26898600"/>
+            <a:ext cx="469297" cy="469297"/>
+          </a:xfrm>
+          <a:prstGeom prst="rect">
+            <a:avLst/>
+          </a:prstGeom>
+          <a:noFill/>
+          <a:extLst>
+            <a:ext uri="{909E8E84-426E-40DD-AFC4-6F175D3DCCD1}">
+              <a14:hiddenFill xmlns:a14="http://schemas.microsoft.com/office/drawing/2010/main">
+                <a:solidFill>
+                  <a:srgbClr val="FFFFFF"/>
+                </a:solidFill>
+              </a14:hiddenFill>
+            </a:ext>
+          </a:extLst>
+        </p:spPr>
+      </p:pic>
+      <p:pic>
+        <p:nvPicPr>
+          <p:cNvPr id="14" name="Picture 13"/>
+          <p:cNvPicPr>
+            <a:picLocks noChangeAspect="1"/>
+          </p:cNvPicPr>
+          <p:nvPr/>
+        </p:nvPicPr>
+        <p:blipFill>
+          <a:blip r:embed="rId9" cstate="print">
+            <a:extLst>
+              <a:ext uri="{28A0092B-C50C-407E-A947-70E740481C1C}">
+                <a14:useLocalDpi xmlns:a14="http://schemas.microsoft.com/office/drawing/2010/main" val="0"/>
+              </a:ext>
+            </a:extLst>
+          </a:blip>
+          <a:stretch>
+            <a:fillRect/>
+          </a:stretch>
+        </p:blipFill>
+        <p:spPr>
+          <a:xfrm>
+            <a:off x="1207039" y="25411920"/>
+            <a:ext cx="469426" cy="469298"/>
+          </a:xfrm>
+          <a:prstGeom prst="rect">
+            <a:avLst/>
+          </a:prstGeom>
+        </p:spPr>
+      </p:pic>
     </p:spTree>
   </p:cSld>
   <p:clrMapOvr>

</xml_diff>